<commit_message>
ngay 17/12 sưa bai worl
</commit_message>
<xml_diff>
--- a/111.pptx
+++ b/111.pptx
@@ -6,7 +6,7 @@
     <p:sldMasterId id="2147483726" r:id="rId2"/>
   </p:sldMasterIdLst>
   <p:notesMasterIdLst>
-    <p:notesMasterId r:id="rId39"/>
+    <p:notesMasterId r:id="rId38"/>
   </p:notesMasterIdLst>
   <p:sldIdLst>
     <p:sldId id="256" r:id="rId3"/>
@@ -38,13 +38,12 @@
     <p:sldId id="305" r:id="rId29"/>
     <p:sldId id="318" r:id="rId30"/>
     <p:sldId id="319" r:id="rId31"/>
-    <p:sldId id="320" r:id="rId32"/>
-    <p:sldId id="322" r:id="rId33"/>
-    <p:sldId id="314" r:id="rId34"/>
-    <p:sldId id="315" r:id="rId35"/>
-    <p:sldId id="316" r:id="rId36"/>
-    <p:sldId id="308" r:id="rId37"/>
-    <p:sldId id="317" r:id="rId38"/>
+    <p:sldId id="322" r:id="rId32"/>
+    <p:sldId id="314" r:id="rId33"/>
+    <p:sldId id="315" r:id="rId34"/>
+    <p:sldId id="316" r:id="rId35"/>
+    <p:sldId id="308" r:id="rId36"/>
+    <p:sldId id="317" r:id="rId37"/>
   </p:sldIdLst>
   <p:sldSz cx="12192000" cy="6858000"/>
   <p:notesSz cx="6858000" cy="9144000"/>
@@ -22160,7 +22159,7 @@
           <a:graphicData uri="http://schemas.openxmlformats.org/presentationml/2006/ole">
             <mc:AlternateContent xmlns:mc="http://schemas.openxmlformats.org/markup-compatibility/2006">
               <mc:Choice xmlns:v="urn:schemas-microsoft-com:vml" Requires="v">
-                <p:oleObj spid="_x0000_s1040" name="Visio" r:id="rId3" imgW="6705659" imgH="2933621" progId="Visio.Drawing.15">
+                <p:oleObj spid="_x0000_s1041" name="Visio" r:id="rId3" imgW="6705659" imgH="2933621" progId="Visio.Drawing.15">
                   <p:embed/>
                 </p:oleObj>
               </mc:Choice>
@@ -23558,6 +23557,13 @@
   <p:clrMapOvr>
     <a:masterClrMapping/>
   </p:clrMapOvr>
+  <p:timing>
+    <p:tnLst>
+      <p:par>
+        <p:cTn id="1" dur="indefinite" restart="never" nodeType="tmRoot"/>
+      </p:par>
+    </p:tnLst>
+  </p:timing>
 </p:sld>
 </file>
 
@@ -23586,8 +23592,8 @@
         </p:nvSpPr>
         <p:spPr>
           <a:xfrm>
-            <a:off x="469093" y="414630"/>
-            <a:ext cx="3289683" cy="593304"/>
+            <a:off x="-342246" y="0"/>
+            <a:ext cx="2629246" cy="468077"/>
           </a:xfrm>
           <a:prstGeom prst="rect">
             <a:avLst/>
@@ -23608,7 +23614,7 @@
               </a:spcAft>
             </a:pPr>
             <a:r>
-              <a:rPr lang="en-US" sz="3200" b="1" dirty="0" err="1">
+              <a:rPr lang="en-US" sz="2400" b="1" dirty="0" err="1">
                 <a:latin typeface="Times New Roman" panose="02020603050405020304" pitchFamily="18" charset="0"/>
                 <a:ea typeface="Calibri" panose="020F0502020204030204" pitchFamily="34" charset="0"/>
                 <a:cs typeface="Times New Roman" panose="02020603050405020304" pitchFamily="18" charset="0"/>
@@ -23616,7 +23622,7 @@
               <a:t>Máy</a:t>
             </a:r>
             <a:r>
-              <a:rPr lang="en-US" sz="3200" b="1" dirty="0">
+              <a:rPr lang="en-US" sz="2400" b="1" dirty="0">
                 <a:latin typeface="Times New Roman" panose="02020603050405020304" pitchFamily="18" charset="0"/>
                 <a:ea typeface="Calibri" panose="020F0502020204030204" pitchFamily="34" charset="0"/>
                 <a:cs typeface="Times New Roman" panose="02020603050405020304" pitchFamily="18" charset="0"/>
@@ -23624,7 +23630,7 @@
               <a:t> </a:t>
             </a:r>
             <a:r>
-              <a:rPr lang="en-US" sz="3200" b="1" dirty="0" err="1">
+              <a:rPr lang="en-US" sz="2400" b="1" dirty="0" err="1">
                 <a:latin typeface="Times New Roman" panose="02020603050405020304" pitchFamily="18" charset="0"/>
                 <a:ea typeface="Calibri" panose="020F0502020204030204" pitchFamily="34" charset="0"/>
                 <a:cs typeface="Times New Roman" panose="02020603050405020304" pitchFamily="18" charset="0"/>
@@ -23632,7 +23638,7 @@
               <a:t>trạng</a:t>
             </a:r>
             <a:r>
-              <a:rPr lang="en-US" sz="3200" b="1" dirty="0">
+              <a:rPr lang="en-US" sz="2400" b="1" dirty="0">
                 <a:latin typeface="Times New Roman" panose="02020603050405020304" pitchFamily="18" charset="0"/>
                 <a:ea typeface="Calibri" panose="020F0502020204030204" pitchFamily="34" charset="0"/>
                 <a:cs typeface="Times New Roman" panose="02020603050405020304" pitchFamily="18" charset="0"/>
@@ -23640,14 +23646,14 @@
               <a:t> </a:t>
             </a:r>
             <a:r>
-              <a:rPr lang="en-US" sz="3200" b="1" dirty="0" err="1">
+              <a:rPr lang="en-US" sz="2400" b="1" dirty="0" err="1">
                 <a:latin typeface="Times New Roman" panose="02020603050405020304" pitchFamily="18" charset="0"/>
                 <a:ea typeface="Calibri" panose="020F0502020204030204" pitchFamily="34" charset="0"/>
                 <a:cs typeface="Times New Roman" panose="02020603050405020304" pitchFamily="18" charset="0"/>
               </a:rPr>
               <a:t>thái</a:t>
             </a:r>
-            <a:endParaRPr lang="en-US" sz="3200" dirty="0">
+            <a:endParaRPr lang="en-US" sz="2400" dirty="0">
               <a:effectLst/>
               <a:latin typeface="Calibri" panose="020F0502020204030204" pitchFamily="34" charset="0"/>
               <a:ea typeface="Calibri" panose="020F0502020204030204" pitchFamily="34" charset="0"/>
@@ -23665,20 +23671,20 @@
           <p:nvPr>
             <p:extLst>
               <p:ext uri="{D42A27DB-BD31-4B8C-83A1-F6EECF244321}">
-                <p14:modId xmlns:p14="http://schemas.microsoft.com/office/powerpoint/2010/main" val="961125642"/>
+                <p14:modId xmlns:p14="http://schemas.microsoft.com/office/powerpoint/2010/main" val="1151342534"/>
               </p:ext>
             </p:extLst>
           </p:nvPr>
         </p:nvGraphicFramePr>
         <p:xfrm>
-          <a:off x="1356361" y="1007934"/>
-          <a:ext cx="9734425" cy="5013124"/>
+          <a:off x="0" y="105450"/>
+          <a:ext cx="8229600" cy="6000750"/>
         </p:xfrm>
         <a:graphic>
           <a:graphicData uri="http://schemas.openxmlformats.org/presentationml/2006/ole">
             <mc:AlternateContent xmlns:mc="http://schemas.openxmlformats.org/markup-compatibility/2006">
               <mc:Choice xmlns:v="urn:schemas-microsoft-com:vml" Requires="v">
-                <p:oleObj spid="_x0000_s2053" name="Visio" r:id="rId3" imgW="6257834" imgH="3400437" progId="Visio.Drawing.15">
+                <p:oleObj spid="_x0000_s2054" name="Visio" r:id="rId3" imgW="6257834" imgH="3400437" progId="Visio.Drawing.15">
                   <p:embed/>
                 </p:oleObj>
               </mc:Choice>
@@ -23708,8 +23714,8 @@
                     </p:blipFill>
                     <p:spPr bwMode="auto">
                       <a:xfrm>
-                        <a:off x="1356361" y="1007934"/>
-                        <a:ext cx="9734425" cy="5013124"/>
+                        <a:off x="0" y="105450"/>
+                        <a:ext cx="8229600" cy="6000750"/>
                       </a:xfrm>
                       <a:prstGeom prst="rect">
                         <a:avLst/>
@@ -23723,6 +23729,30 @@
           </a:graphicData>
         </a:graphic>
       </p:graphicFrame>
+      <p:pic>
+        <p:nvPicPr>
+          <p:cNvPr id="5" name="Picture 4"/>
+          <p:cNvPicPr>
+            <a:picLocks noChangeAspect="1"/>
+          </p:cNvPicPr>
+          <p:nvPr/>
+        </p:nvPicPr>
+        <p:blipFill>
+          <a:blip r:embed="rId5"/>
+          <a:stretch>
+            <a:fillRect/>
+          </a:stretch>
+        </p:blipFill>
+        <p:spPr>
+          <a:xfrm>
+            <a:off x="6315076" y="3957639"/>
+            <a:ext cx="6000749" cy="2786062"/>
+          </a:xfrm>
+          <a:prstGeom prst="rect">
+            <a:avLst/>
+          </a:prstGeom>
+        </p:spPr>
+      </p:pic>
     </p:spTree>
     <p:extLst>
       <p:ext uri="{BB962C8B-B14F-4D97-AF65-F5344CB8AC3E}">
@@ -23733,6 +23763,13 @@
   <p:clrMapOvr>
     <a:masterClrMapping/>
   </p:clrMapOvr>
+  <p:timing>
+    <p:tnLst>
+      <p:par>
+        <p:cTn id="1" dur="indefinite" restart="never" nodeType="tmRoot"/>
+      </p:par>
+    </p:tnLst>
+  </p:timing>
 </p:sld>
 </file>
 
@@ -25204,60 +25241,6 @@
 </file>
 
 <file path=ppt/slides/slide30.xml><?xml version="1.0" encoding="utf-8"?>
-<p:sld xmlns:a="http://schemas.openxmlformats.org/drawingml/2006/main" xmlns:r="http://schemas.openxmlformats.org/officeDocument/2006/relationships" xmlns:p="http://schemas.openxmlformats.org/presentationml/2006/main">
-  <p:cSld>
-    <p:spTree>
-      <p:nvGrpSpPr>
-        <p:cNvPr id="1" name=""/>
-        <p:cNvGrpSpPr/>
-        <p:nvPr/>
-      </p:nvGrpSpPr>
-      <p:grpSpPr>
-        <a:xfrm>
-          <a:off x="0" y="0"/>
-          <a:ext cx="0" cy="0"/>
-          <a:chOff x="0" y="0"/>
-          <a:chExt cx="0" cy="0"/>
-        </a:xfrm>
-      </p:grpSpPr>
-      <p:pic>
-        <p:nvPicPr>
-          <p:cNvPr id="5" name="Picture 4"/>
-          <p:cNvPicPr>
-            <a:picLocks noChangeAspect="1"/>
-          </p:cNvPicPr>
-          <p:nvPr/>
-        </p:nvPicPr>
-        <p:blipFill>
-          <a:blip r:embed="rId2"/>
-          <a:stretch>
-            <a:fillRect/>
-          </a:stretch>
-        </p:blipFill>
-        <p:spPr>
-          <a:xfrm>
-            <a:off x="787349" y="860169"/>
-            <a:ext cx="10565184" cy="5053934"/>
-          </a:xfrm>
-          <a:prstGeom prst="rect">
-            <a:avLst/>
-          </a:prstGeom>
-        </p:spPr>
-      </p:pic>
-    </p:spTree>
-    <p:extLst>
-      <p:ext uri="{BB962C8B-B14F-4D97-AF65-F5344CB8AC3E}">
-        <p14:creationId xmlns:p14="http://schemas.microsoft.com/office/powerpoint/2010/main" val="1964366945"/>
-      </p:ext>
-    </p:extLst>
-  </p:cSld>
-  <p:clrMapOvr>
-    <a:masterClrMapping/>
-  </p:clrMapOvr>
-</p:sld>
-</file>
-
-<file path=ppt/slides/slide31.xml><?xml version="1.0" encoding="utf-8"?>
 <p:sld xmlns:a="http://schemas.openxmlformats.org/drawingml/2006/main" xmlns:r="http://schemas.openxmlformats.org/officeDocument/2006/relationships" xmlns:p="http://schemas.openxmlformats.org/presentationml/2006/main">
   <p:cSld>
     <p:spTree>
@@ -25362,7 +25345,7 @@
 </p:sld>
 </file>
 
-<file path=ppt/slides/slide32.xml><?xml version="1.0" encoding="utf-8"?>
+<file path=ppt/slides/slide31.xml><?xml version="1.0" encoding="utf-8"?>
 <p:sld xmlns:a="http://schemas.openxmlformats.org/drawingml/2006/main" xmlns:r="http://schemas.openxmlformats.org/officeDocument/2006/relationships" xmlns:p="http://schemas.openxmlformats.org/presentationml/2006/main">
   <p:cSld>
     <p:spTree>
@@ -25422,7 +25405,7 @@
 </p:sld>
 </file>
 
-<file path=ppt/slides/slide33.xml><?xml version="1.0" encoding="utf-8"?>
+<file path=ppt/slides/slide32.xml><?xml version="1.0" encoding="utf-8"?>
 <p:sld xmlns:a="http://schemas.openxmlformats.org/drawingml/2006/main" xmlns:r="http://schemas.openxmlformats.org/officeDocument/2006/relationships" xmlns:p="http://schemas.openxmlformats.org/presentationml/2006/main">
   <p:cSld>
     <p:spTree>
@@ -25482,7 +25465,7 @@
 </p:sld>
 </file>
 
-<file path=ppt/slides/slide34.xml><?xml version="1.0" encoding="utf-8"?>
+<file path=ppt/slides/slide33.xml><?xml version="1.0" encoding="utf-8"?>
 <p:sld xmlns:a="http://schemas.openxmlformats.org/drawingml/2006/main" xmlns:r="http://schemas.openxmlformats.org/officeDocument/2006/relationships" xmlns:p="http://schemas.openxmlformats.org/presentationml/2006/main">
   <p:cSld>
     <p:spTree>
@@ -25542,7 +25525,7 @@
 </p:sld>
 </file>
 
-<file path=ppt/slides/slide35.xml><?xml version="1.0" encoding="utf-8"?>
+<file path=ppt/slides/slide34.xml><?xml version="1.0" encoding="utf-8"?>
 <p:sld xmlns:a="http://schemas.openxmlformats.org/drawingml/2006/main" xmlns:r="http://schemas.openxmlformats.org/officeDocument/2006/relationships" xmlns:p="http://schemas.openxmlformats.org/presentationml/2006/main">
   <p:cSld>
     <p:spTree>
@@ -25603,7 +25586,7 @@
 </p:sld>
 </file>
 
-<file path=ppt/slides/slide36.xml><?xml version="1.0" encoding="utf-8"?>
+<file path=ppt/slides/slide35.xml><?xml version="1.0" encoding="utf-8"?>
 <p:sld xmlns:a="http://schemas.openxmlformats.org/drawingml/2006/main" xmlns:r="http://schemas.openxmlformats.org/officeDocument/2006/relationships" xmlns:p="http://schemas.openxmlformats.org/presentationml/2006/main">
   <p:cSld>
     <p:spTree>

</xml_diff>